<commit_message>
Update slide and fix category
</commit_message>
<xml_diff>
--- a/Documentation/NU E-Commerce Slide.pptx
+++ b/Documentation/NU E-Commerce Slide.pptx
@@ -1100,7 +1100,7 @@
         </p:nvSpPr>
         <p:spPr>
           <a:xfrm>
-            <a:off x="2414774" y="4669535"/>
+            <a:off x="2414774" y="4688205"/>
             <a:ext cx="5059680" cy="474345"/>
           </a:xfrm>
           <a:custGeom>
@@ -1135,6 +1135,10 @@
           <a:bodyPr wrap="square" lIns="0" tIns="0" rIns="0" bIns="0" rtlCol="0"/>
           <a:lstStyle/>
           <a:p>
+            <a:r>
+              <a:rPr lang="en-US"/>
+              <a:t>`</a:t>
+            </a:r>
             <a:endParaRPr/>
           </a:p>
         </p:txBody>
@@ -1362,7 +1366,7 @@
           <a:p>
             <a:fld id="{1D8BD707-D9CF-40AE-B4C6-C98DA3205C09}" type="datetimeFigureOut">
               <a:rPr lang="en-US"/>
-              <a:t>22-Mar-18</a:t>
+              <a:t>10-Apr-18</a:t>
             </a:fld>
             <a:endParaRPr lang="en-US"/>
           </a:p>
@@ -1614,7 +1618,7 @@
           <a:p>
             <a:fld id="{1D8BD707-D9CF-40AE-B4C6-C98DA3205C09}" type="datetimeFigureOut">
               <a:rPr lang="en-US" smtClean="0"/>
-              <a:t>22-Mar-18</a:t>
+              <a:t>10-Apr-18</a:t>
             </a:fld>
             <a:endParaRPr lang="en-US"/>
           </a:p>
@@ -2858,7 +2862,7 @@
           <a:p>
             <a:fld id="{1D8BD707-D9CF-40AE-B4C6-C98DA3205C09}" type="datetimeFigureOut">
               <a:rPr lang="en-US"/>
-              <a:t>22-Mar-18</a:t>
+              <a:t>10-Apr-18</a:t>
             </a:fld>
             <a:endParaRPr lang="en-US"/>
           </a:p>
@@ -3114,7 +3118,7 @@
           <a:p>
             <a:fld id="{1D8BD707-D9CF-40AE-B4C6-C98DA3205C09}" type="datetimeFigureOut">
               <a:rPr lang="en-US"/>
-              <a:t>22-Mar-18</a:t>
+              <a:t>10-Apr-18</a:t>
             </a:fld>
             <a:endParaRPr lang="en-US"/>
           </a:p>
@@ -3480,7 +3484,7 @@
           <a:p>
             <a:fld id="{1D8BD707-D9CF-40AE-B4C6-C98DA3205C09}" type="datetimeFigureOut">
               <a:rPr lang="en-US"/>
-              <a:t>22-Mar-18</a:t>
+              <a:t>10-Apr-18</a:t>
             </a:fld>
             <a:endParaRPr lang="en-US"/>
           </a:p>
@@ -3806,6 +3810,41 @@
           <a:chExt cx="0" cy="0"/>
         </a:xfrm>
       </p:grpSpPr>
+      <p:pic>
+        <p:nvPicPr>
+          <p:cNvPr id="8" name="Picture 7">
+            <a:extLst>
+              <a:ext uri="{FF2B5EF4-FFF2-40B4-BE49-F238E27FC236}">
+                <a16:creationId xmlns:a16="http://schemas.microsoft.com/office/drawing/2014/main" id="{BC0F86C4-0BA7-41FF-BFD1-7E7C7981A1D9}"/>
+              </a:ext>
+            </a:extLst>
+          </p:cNvPr>
+          <p:cNvPicPr>
+            <a:picLocks noChangeAspect="1"/>
+          </p:cNvPicPr>
+          <p:nvPr/>
+        </p:nvPicPr>
+        <p:blipFill rotWithShape="1">
+          <a:blip r:embed="rId3">
+            <a:extLst>
+              <a:ext uri="{28A0092B-C50C-407E-A947-70E740481C1C}">
+                <a14:useLocalDpi xmlns:a14="http://schemas.microsoft.com/office/drawing/2010/main" val="0"/>
+              </a:ext>
+            </a:extLst>
+          </a:blip>
+          <a:srcRect t="1" b="20671"/>
+          <a:stretch/>
+        </p:blipFill>
+        <p:spPr>
+          <a:xfrm>
+            <a:off x="4648200" y="929934"/>
+            <a:ext cx="5143500" cy="4080216"/>
+          </a:xfrm>
+          <a:prstGeom prst="rect">
+            <a:avLst/>
+          </a:prstGeom>
+        </p:spPr>
+      </p:pic>
       <p:sp>
         <p:nvSpPr>
           <p:cNvPr id="2" name="object 2"/>
@@ -3894,24 +3933,105 @@
       </p:sp>
       <p:sp>
         <p:nvSpPr>
-          <p:cNvPr id="4" name="object 4"/>
+          <p:cNvPr id="9" name="bk object 16">
+            <a:extLst>
+              <a:ext uri="{FF2B5EF4-FFF2-40B4-BE49-F238E27FC236}">
+                <a16:creationId xmlns:a16="http://schemas.microsoft.com/office/drawing/2014/main" id="{44322E66-3CFB-473A-A0E4-3B8BC8205A79}"/>
+              </a:ext>
+            </a:extLst>
+          </p:cNvPr>
           <p:cNvSpPr/>
           <p:nvPr/>
         </p:nvSpPr>
         <p:spPr>
           <a:xfrm>
-            <a:off x="5795771" y="1708404"/>
-            <a:ext cx="2592324" cy="2644140"/>
-          </a:xfrm>
-          <a:prstGeom prst="rect">
-            <a:avLst/>
-          </a:prstGeom>
-          <a:blipFill>
-            <a:blip r:embed="rId3" cstate="print"/>
-            <a:stretch>
-              <a:fillRect/>
-            </a:stretch>
-          </a:blipFill>
+            <a:off x="2414774" y="4688205"/>
+            <a:ext cx="5059680" cy="474345"/>
+          </a:xfrm>
+          <a:custGeom>
+            <a:avLst/>
+            <a:gdLst/>
+            <a:ahLst/>
+            <a:cxnLst/>
+            <a:rect l="l" t="t" r="r" b="b"/>
+            <a:pathLst>
+              <a:path w="5059680" h="474345">
+                <a:moveTo>
+                  <a:pt x="3908301" y="0"/>
+                </a:moveTo>
+                <a:lnTo>
+                  <a:pt x="0" y="473962"/>
+                </a:lnTo>
+                <a:lnTo>
+                  <a:pt x="5059138" y="473962"/>
+                </a:lnTo>
+                <a:lnTo>
+                  <a:pt x="3908301" y="0"/>
+                </a:lnTo>
+                <a:close/>
+              </a:path>
+            </a:pathLst>
+          </a:custGeom>
+          <a:solidFill>
+            <a:srgbClr val="1154CC"/>
+          </a:solidFill>
+        </p:spPr>
+        <p:txBody>
+          <a:bodyPr wrap="square" lIns="0" tIns="0" rIns="0" bIns="0" rtlCol="0"/>
+          <a:lstStyle/>
+          <a:p>
+            <a:r>
+              <a:rPr lang="en-US"/>
+              <a:t>`</a:t>
+            </a:r>
+            <a:endParaRPr/>
+          </a:p>
+        </p:txBody>
+      </p:sp>
+      <p:sp>
+        <p:nvSpPr>
+          <p:cNvPr id="10" name="bk object 17">
+            <a:extLst>
+              <a:ext uri="{FF2B5EF4-FFF2-40B4-BE49-F238E27FC236}">
+                <a16:creationId xmlns:a16="http://schemas.microsoft.com/office/drawing/2014/main" id="{9E61506F-C6B7-48A1-86AA-C993EF565C3A}"/>
+              </a:ext>
+            </a:extLst>
+          </p:cNvPr>
+          <p:cNvSpPr/>
+          <p:nvPr/>
+        </p:nvSpPr>
+        <p:spPr>
+          <a:xfrm>
+            <a:off x="5507735" y="4672584"/>
+            <a:ext cx="3636645" cy="471170"/>
+          </a:xfrm>
+          <a:custGeom>
+            <a:avLst/>
+            <a:gdLst/>
+            <a:ahLst/>
+            <a:cxnLst/>
+            <a:rect l="l" t="t" r="r" b="b"/>
+            <a:pathLst>
+              <a:path w="3636645" h="471170">
+                <a:moveTo>
+                  <a:pt x="3636264" y="0"/>
+                </a:moveTo>
+                <a:lnTo>
+                  <a:pt x="0" y="470915"/>
+                </a:lnTo>
+                <a:lnTo>
+                  <a:pt x="3636264" y="470915"/>
+                </a:lnTo>
+                <a:lnTo>
+                  <a:pt x="3636264" y="0"/>
+                </a:lnTo>
+                <a:close/>
+              </a:path>
+            </a:pathLst>
+          </a:custGeom>
+          <a:solidFill>
+            <a:srgbClr val="30D0FF"/>
+          </a:solidFill>
         </p:spPr>
         <p:txBody>
           <a:bodyPr wrap="square" lIns="0" tIns="0" rIns="0" bIns="0" rtlCol="0"/>
@@ -3971,7 +4091,7 @@
           <a:bodyPr wrap="square" lIns="0" tIns="0" rIns="0" bIns="0" rtlCol="0"/>
           <a:lstStyle/>
           <a:p>
-            <a:endParaRPr/>
+            <a:endParaRPr dirty="0"/>
           </a:p>
         </p:txBody>
       </p:sp>
@@ -4069,6 +4189,42 @@
           </a:p>
         </p:txBody>
       </p:sp>
+      <p:pic>
+        <p:nvPicPr>
+          <p:cNvPr id="3" name="Picture 2">
+            <a:extLst>
+              <a:ext uri="{FF2B5EF4-FFF2-40B4-BE49-F238E27FC236}">
+                <a16:creationId xmlns:a16="http://schemas.microsoft.com/office/drawing/2014/main" id="{ACFC1B51-89DD-492A-BD96-65D404E02F60}"/>
+              </a:ext>
+            </a:extLst>
+          </p:cNvPr>
+          <p:cNvPicPr>
+            <a:picLocks noChangeAspect="1"/>
+          </p:cNvPicPr>
+          <p:nvPr/>
+        </p:nvPicPr>
+        <p:blipFill>
+          <a:blip r:embed="rId4">
+            <a:extLst>
+              <a:ext uri="{28A0092B-C50C-407E-A947-70E740481C1C}">
+                <a14:useLocalDpi xmlns:a14="http://schemas.microsoft.com/office/drawing/2010/main" val="0"/>
+              </a:ext>
+            </a:extLst>
+          </a:blip>
+          <a:stretch>
+            <a:fillRect/>
+          </a:stretch>
+        </p:blipFill>
+        <p:spPr>
+          <a:xfrm>
+            <a:off x="5328217" y="874776"/>
+            <a:ext cx="3358618" cy="3352523"/>
+          </a:xfrm>
+          <a:prstGeom prst="rect">
+            <a:avLst/>
+          </a:prstGeom>
+        </p:spPr>
+      </p:pic>
     </p:spTree>
     <p:extLst>
       <p:ext uri="{BB962C8B-B14F-4D97-AF65-F5344CB8AC3E}">
@@ -4793,7 +4949,7 @@
                 <a:latin typeface="Verdana"/>
                 <a:cs typeface="Verdana"/>
               </a:rPr>
-              <a:t>Get inform when we found your product’s owner</a:t>
+              <a:t>When we found your product’s owner</a:t>
             </a:r>
           </a:p>
           <a:p>
@@ -4822,7 +4978,7 @@
                 <a:latin typeface="Verdana"/>
                 <a:cs typeface="Verdana"/>
               </a:rPr>
-              <a:t>Get inform when we found an item that you’ll need</a:t>
+              <a:t>When we found an item that you’ll need</a:t>
             </a:r>
           </a:p>
           <a:p>
@@ -4851,7 +5007,21 @@
                 <a:latin typeface="Verdana"/>
                 <a:cs typeface="Verdana"/>
               </a:rPr>
-              <a:t>See related products that you may need</a:t>
+              <a:t>When </a:t>
+            </a:r>
+            <a:r>
+              <a:rPr lang="en-US">
+                <a:latin typeface="Verdana"/>
+                <a:cs typeface="Verdana"/>
+              </a:rPr>
+              <a:t>we found a related </a:t>
+            </a:r>
+            <a:r>
+              <a:rPr lang="en-US" dirty="0">
+                <a:latin typeface="Verdana"/>
+                <a:cs typeface="Verdana"/>
+              </a:rPr>
+              <a:t>products that you may need</a:t>
             </a:r>
           </a:p>
         </p:txBody>
@@ -4956,7 +5126,7 @@
           <a:bodyPr wrap="square" lIns="0" tIns="0" rIns="0" bIns="0" rtlCol="0"/>
           <a:lstStyle/>
           <a:p>
-            <a:endParaRPr/>
+            <a:endParaRPr dirty="0"/>
           </a:p>
         </p:txBody>
       </p:sp>
@@ -5054,6 +5224,42 @@
           </a:p>
         </p:txBody>
       </p:sp>
+      <p:pic>
+        <p:nvPicPr>
+          <p:cNvPr id="3" name="Picture 2">
+            <a:extLst>
+              <a:ext uri="{FF2B5EF4-FFF2-40B4-BE49-F238E27FC236}">
+                <a16:creationId xmlns:a16="http://schemas.microsoft.com/office/drawing/2014/main" id="{92DA74F1-0FFC-45CA-BFE0-CAEDEEDF4A04}"/>
+              </a:ext>
+            </a:extLst>
+          </p:cNvPr>
+          <p:cNvPicPr>
+            <a:picLocks noChangeAspect="1"/>
+          </p:cNvPicPr>
+          <p:nvPr/>
+        </p:nvPicPr>
+        <p:blipFill>
+          <a:blip r:embed="rId4">
+            <a:extLst>
+              <a:ext uri="{28A0092B-C50C-407E-A947-70E740481C1C}">
+                <a14:useLocalDpi xmlns:a14="http://schemas.microsoft.com/office/drawing/2010/main" val="0"/>
+              </a:ext>
+            </a:extLst>
+          </a:blip>
+          <a:stretch>
+            <a:fillRect/>
+          </a:stretch>
+        </p:blipFill>
+        <p:spPr>
+          <a:xfrm>
+            <a:off x="5724427" y="1265398"/>
+            <a:ext cx="3419573" cy="2919743"/>
+          </a:xfrm>
+          <a:prstGeom prst="rect">
+            <a:avLst/>
+          </a:prstGeom>
+        </p:spPr>
+      </p:pic>
     </p:spTree>
   </p:cSld>
   <p:clrMapOvr>
@@ -5119,10 +5325,10 @@
       </p:sp>
       <p:grpSp>
         <p:nvGrpSpPr>
-          <p:cNvPr id="6" name="Group 5">
+          <p:cNvPr id="3" name="Group 2">
             <a:extLst>
               <a:ext uri="{FF2B5EF4-FFF2-40B4-BE49-F238E27FC236}">
-                <a16:creationId xmlns:a16="http://schemas.microsoft.com/office/drawing/2014/main" id="{719827D3-CB22-439F-BD83-2E38337A5BEA}"/>
+                <a16:creationId xmlns:a16="http://schemas.microsoft.com/office/drawing/2014/main" id="{6C22EAC3-6CB8-4311-A116-DB0E7BD5B96C}"/>
               </a:ext>
             </a:extLst>
           </p:cNvPr>
@@ -5133,8 +5339,8 @@
           <a:xfrm>
             <a:off x="4004172" y="438150"/>
             <a:ext cx="5021162" cy="4191000"/>
-            <a:chOff x="4571999" y="920853"/>
-            <a:chExt cx="3943350" cy="3291386"/>
+            <a:chOff x="4004172" y="438150"/>
+            <a:chExt cx="5021162" cy="4191000"/>
           </a:xfrm>
         </p:grpSpPr>
         <p:pic>
@@ -5164,8 +5370,8 @@
           </p:blipFill>
           <p:spPr bwMode="auto">
             <a:xfrm>
-              <a:off x="4571999" y="920853"/>
-              <a:ext cx="3943350" cy="3291386"/>
+              <a:off x="4004172" y="438150"/>
+              <a:ext cx="5021162" cy="4191000"/>
             </a:xfrm>
             <a:prstGeom prst="rect">
               <a:avLst/>
@@ -5196,8 +5402,8 @@
           </p:nvSpPr>
           <p:spPr>
             <a:xfrm>
-              <a:off x="4756150" y="1162050"/>
-              <a:ext cx="3581400" cy="2019300"/>
+              <a:off x="4238656" y="745272"/>
+              <a:ext cx="4560282" cy="2571223"/>
             </a:xfrm>
             <a:prstGeom prst="rect">
               <a:avLst/>
@@ -5234,52 +5440,53 @@
             </a:p>
           </p:txBody>
         </p:sp>
-        <p:pic>
-          <p:nvPicPr>
-            <p:cNvPr id="1028" name="Picture 4" descr="Mobile phone with play button on the screen Free Vector">
-              <a:extLst>
-                <a:ext uri="{FF2B5EF4-FFF2-40B4-BE49-F238E27FC236}">
-                  <a16:creationId xmlns:a16="http://schemas.microsoft.com/office/drawing/2014/main" id="{5DF1BB99-65E5-4D26-8164-9B9A967373FA}"/>
-                </a:ext>
-              </a:extLst>
-            </p:cNvPr>
-            <p:cNvPicPr>
-              <a:picLocks noChangeAspect="1" noChangeArrowheads="1"/>
-            </p:cNvPicPr>
-            <p:nvPr/>
-          </p:nvPicPr>
-          <p:blipFill rotWithShape="1">
-            <a:blip r:embed="rId3" cstate="print">
-              <a:extLst>
-                <a:ext uri="{28A0092B-C50C-407E-A947-70E740481C1C}">
-                  <a14:useLocalDpi xmlns:a14="http://schemas.microsoft.com/office/drawing/2010/main" val="0"/>
-                </a:ext>
-              </a:extLst>
-            </a:blip>
-            <a:srcRect b="4717"/>
-            <a:stretch/>
-          </p:blipFill>
-          <p:spPr bwMode="auto">
-            <a:xfrm>
-              <a:off x="5562599" y="1162051"/>
-              <a:ext cx="2119265" cy="2019299"/>
-            </a:xfrm>
-            <a:prstGeom prst="rect">
-              <a:avLst/>
-            </a:prstGeom>
-            <a:noFill/>
+      </p:grpSp>
+      <p:pic>
+        <p:nvPicPr>
+          <p:cNvPr id="1028" name="Picture 4">
             <a:extLst>
-              <a:ext uri="{909E8E84-426E-40DD-AFC4-6F175D3DCCD1}">
-                <a14:hiddenFill xmlns:a14="http://schemas.microsoft.com/office/drawing/2010/main">
-                  <a:solidFill>
-                    <a:srgbClr val="FFFFFF"/>
-                  </a:solidFill>
-                </a14:hiddenFill>
+              <a:ext uri="{FF2B5EF4-FFF2-40B4-BE49-F238E27FC236}">
+                <a16:creationId xmlns:a16="http://schemas.microsoft.com/office/drawing/2014/main" id="{5DF1BB99-65E5-4D26-8164-9B9A967373FA}"/>
               </a:ext>
             </a:extLst>
-          </p:spPr>
-        </p:pic>
-      </p:grpSp>
+          </p:cNvPr>
+          <p:cNvPicPr>
+            <a:picLocks noChangeAspect="1" noChangeArrowheads="1"/>
+          </p:cNvPicPr>
+          <p:nvPr/>
+        </p:nvPicPr>
+        <p:blipFill>
+          <a:blip r:embed="rId3">
+            <a:extLst>
+              <a:ext uri="{28A0092B-C50C-407E-A947-70E740481C1C}">
+                <a14:useLocalDpi xmlns:a14="http://schemas.microsoft.com/office/drawing/2010/main" val="0"/>
+              </a:ext>
+            </a:extLst>
+          </a:blip>
+          <a:stretch>
+            <a:fillRect/>
+          </a:stretch>
+        </p:blipFill>
+        <p:spPr bwMode="auto">
+          <a:xfrm>
+            <a:off x="5268243" y="745273"/>
+            <a:ext cx="2693079" cy="2571221"/>
+          </a:xfrm>
+          <a:prstGeom prst="rect">
+            <a:avLst/>
+          </a:prstGeom>
+          <a:noFill/>
+          <a:extLst>
+            <a:ext uri="{909E8E84-426E-40DD-AFC4-6F175D3DCCD1}">
+              <a14:hiddenFill xmlns:a14="http://schemas.microsoft.com/office/drawing/2010/main">
+                <a:solidFill>
+                  <a:srgbClr val="FFFFFF"/>
+                </a:solidFill>
+              </a14:hiddenFill>
+            </a:ext>
+          </a:extLst>
+        </p:spPr>
+      </p:pic>
     </p:spTree>
     <p:extLst>
       <p:ext uri="{BB962C8B-B14F-4D97-AF65-F5344CB8AC3E}">
@@ -7196,7 +7403,7 @@
           <p:nvPr/>
         </p:nvPicPr>
         <p:blipFill>
-          <a:blip r:embed="rId3" cstate="print">
+          <a:blip r:embed="rId3">
             <a:extLst>
               <a:ext uri="{28A0092B-C50C-407E-A947-70E740481C1C}">
                 <a14:useLocalDpi xmlns:a14="http://schemas.microsoft.com/office/drawing/2010/main" val="0"/>
@@ -7209,8 +7416,8 @@
         </p:blipFill>
         <p:spPr>
           <a:xfrm>
-            <a:off x="4941321" y="655072"/>
-            <a:ext cx="3661906" cy="3661906"/>
+            <a:off x="4944367" y="655072"/>
+            <a:ext cx="3655813" cy="3661906"/>
           </a:xfrm>
           <a:prstGeom prst="rect">
             <a:avLst/>

</xml_diff>